<commit_message>
updates to shapes tutorials, new challenge
</commit_message>
<xml_diff>
--- a/Shapes/Challenge1/Challenge1.pptx
+++ b/Shapes/Challenge1/Challenge1.pptx
@@ -104,6 +104,11 @@
       </a:defRPr>
     </a:lvl9pPr>
   </p:defaultTextStyle>
+  <p:extLst>
+    <p:ext uri="{EFAFB233-063F-42B5-8137-9DF3F51BA10A}">
+      <p15:sldGuideLst xmlns:p15="http://schemas.microsoft.com/office/powerpoint/2012/main"/>
+    </p:ext>
+  </p:extLst>
 </p:presentation>
 </file>
 
@@ -238,7 +243,7 @@
           <a:p>
             <a:fld id="{751CFAD4-E2BE-7741-9A4B-454EC5DB59CA}" type="datetimeFigureOut">
               <a:rPr lang="en-US" smtClean="0"/>
-              <a:t>8/14/24</a:t>
+              <a:t>1/22/25</a:t>
             </a:fld>
             <a:endParaRPr lang="en-US"/>
           </a:p>
@@ -408,7 +413,7 @@
           <a:p>
             <a:fld id="{751CFAD4-E2BE-7741-9A4B-454EC5DB59CA}" type="datetimeFigureOut">
               <a:rPr lang="en-US" smtClean="0"/>
-              <a:t>8/14/24</a:t>
+              <a:t>1/22/25</a:t>
             </a:fld>
             <a:endParaRPr lang="en-US"/>
           </a:p>
@@ -588,7 +593,7 @@
           <a:p>
             <a:fld id="{751CFAD4-E2BE-7741-9A4B-454EC5DB59CA}" type="datetimeFigureOut">
               <a:rPr lang="en-US" smtClean="0"/>
-              <a:t>8/14/24</a:t>
+              <a:t>1/22/25</a:t>
             </a:fld>
             <a:endParaRPr lang="en-US"/>
           </a:p>
@@ -758,7 +763,7 @@
           <a:p>
             <a:fld id="{751CFAD4-E2BE-7741-9A4B-454EC5DB59CA}" type="datetimeFigureOut">
               <a:rPr lang="en-US" smtClean="0"/>
-              <a:t>8/14/24</a:t>
+              <a:t>1/22/25</a:t>
             </a:fld>
             <a:endParaRPr lang="en-US"/>
           </a:p>
@@ -1004,7 +1009,7 @@
           <a:p>
             <a:fld id="{751CFAD4-E2BE-7741-9A4B-454EC5DB59CA}" type="datetimeFigureOut">
               <a:rPr lang="en-US" smtClean="0"/>
-              <a:t>8/14/24</a:t>
+              <a:t>1/22/25</a:t>
             </a:fld>
             <a:endParaRPr lang="en-US"/>
           </a:p>
@@ -1236,7 +1241,7 @@
           <a:p>
             <a:fld id="{751CFAD4-E2BE-7741-9A4B-454EC5DB59CA}" type="datetimeFigureOut">
               <a:rPr lang="en-US" smtClean="0"/>
-              <a:t>8/14/24</a:t>
+              <a:t>1/22/25</a:t>
             </a:fld>
             <a:endParaRPr lang="en-US"/>
           </a:p>
@@ -1603,7 +1608,7 @@
           <a:p>
             <a:fld id="{751CFAD4-E2BE-7741-9A4B-454EC5DB59CA}" type="datetimeFigureOut">
               <a:rPr lang="en-US" smtClean="0"/>
-              <a:t>8/14/24</a:t>
+              <a:t>1/22/25</a:t>
             </a:fld>
             <a:endParaRPr lang="en-US"/>
           </a:p>
@@ -1721,7 +1726,7 @@
           <a:p>
             <a:fld id="{751CFAD4-E2BE-7741-9A4B-454EC5DB59CA}" type="datetimeFigureOut">
               <a:rPr lang="en-US" smtClean="0"/>
-              <a:t>8/14/24</a:t>
+              <a:t>1/22/25</a:t>
             </a:fld>
             <a:endParaRPr lang="en-US"/>
           </a:p>
@@ -1816,7 +1821,7 @@
           <a:p>
             <a:fld id="{751CFAD4-E2BE-7741-9A4B-454EC5DB59CA}" type="datetimeFigureOut">
               <a:rPr lang="en-US" smtClean="0"/>
-              <a:t>8/14/24</a:t>
+              <a:t>1/22/25</a:t>
             </a:fld>
             <a:endParaRPr lang="en-US"/>
           </a:p>
@@ -2093,7 +2098,7 @@
           <a:p>
             <a:fld id="{751CFAD4-E2BE-7741-9A4B-454EC5DB59CA}" type="datetimeFigureOut">
               <a:rPr lang="en-US" smtClean="0"/>
-              <a:t>8/14/24</a:t>
+              <a:t>1/22/25</a:t>
             </a:fld>
             <a:endParaRPr lang="en-US"/>
           </a:p>
@@ -2350,7 +2355,7 @@
           <a:p>
             <a:fld id="{751CFAD4-E2BE-7741-9A4B-454EC5DB59CA}" type="datetimeFigureOut">
               <a:rPr lang="en-US" smtClean="0"/>
-              <a:t>8/14/24</a:t>
+              <a:t>1/22/25</a:t>
             </a:fld>
             <a:endParaRPr lang="en-US"/>
           </a:p>
@@ -2563,7 +2568,7 @@
           <a:p>
             <a:fld id="{751CFAD4-E2BE-7741-9A4B-454EC5DB59CA}" type="datetimeFigureOut">
               <a:rPr lang="en-US" smtClean="0"/>
-              <a:t>8/14/24</a:t>
+              <a:t>1/22/25</a:t>
             </a:fld>
             <a:endParaRPr lang="en-US"/>
           </a:p>
@@ -2970,10 +2975,10 @@
       </p:grpSpPr>
       <p:pic>
         <p:nvPicPr>
-          <p:cNvPr id="5" name="Picture 4" descr="A graph of a sound wave&#10;&#10;Description automatically generated">
+          <p:cNvPr id="3" name="Picture 2">
             <a:extLst>
               <a:ext uri="{FF2B5EF4-FFF2-40B4-BE49-F238E27FC236}">
-                <a16:creationId xmlns:a16="http://schemas.microsoft.com/office/drawing/2014/main" id="{0EB36265-8455-827C-6C5D-67DDDAFA080C}"/>
+                <a16:creationId xmlns:a16="http://schemas.microsoft.com/office/drawing/2014/main" id="{D002FFE1-61F9-FFD7-BE67-63F6C952F554}"/>
               </a:ext>
             </a:extLst>
           </p:cNvPr>
@@ -2984,94 +2989,19 @@
         </p:nvPicPr>
         <p:blipFill>
           <a:blip r:embed="rId2"/>
-          <a:stretch>
-            <a:fillRect/>
-          </a:stretch>
+          <a:srcRect/>
+          <a:stretch/>
         </p:blipFill>
         <p:spPr>
           <a:xfrm>
-            <a:off x="1334290" y="655388"/>
-            <a:ext cx="2720935" cy="2487543"/>
+            <a:off x="327397" y="822787"/>
+            <a:ext cx="4244543" cy="2359585"/>
           </a:xfrm>
           <a:prstGeom prst="rect">
             <a:avLst/>
           </a:prstGeom>
         </p:spPr>
       </p:pic>
-      <p:sp>
-        <p:nvSpPr>
-          <p:cNvPr id="6" name="TextBox 5">
-            <a:extLst>
-              <a:ext uri="{FF2B5EF4-FFF2-40B4-BE49-F238E27FC236}">
-                <a16:creationId xmlns:a16="http://schemas.microsoft.com/office/drawing/2014/main" id="{7B2067A6-D52E-C491-995A-954BC027899C}"/>
-              </a:ext>
-            </a:extLst>
-          </p:cNvPr>
-          <p:cNvSpPr txBox="1"/>
-          <p:nvPr/>
-        </p:nvSpPr>
-        <p:spPr>
-          <a:xfrm>
-            <a:off x="2485833" y="3172594"/>
-            <a:ext cx="645048" cy="276999"/>
-          </a:xfrm>
-          <a:prstGeom prst="rect">
-            <a:avLst/>
-          </a:prstGeom>
-          <a:noFill/>
-        </p:spPr>
-        <p:txBody>
-          <a:bodyPr wrap="none" rtlCol="0">
-            <a:spAutoFit/>
-          </a:bodyPr>
-          <a:lstStyle/>
-          <a:p>
-            <a:r>
-              <a:rPr lang="en-US" sz="1200" dirty="0"/>
-              <a:t>q, nm</a:t>
-            </a:r>
-            <a:r>
-              <a:rPr lang="en-US" sz="1200" baseline="30000" dirty="0"/>
-              <a:t>-1</a:t>
-            </a:r>
-          </a:p>
-        </p:txBody>
-      </p:sp>
-      <p:sp>
-        <p:nvSpPr>
-          <p:cNvPr id="7" name="TextBox 6">
-            <a:extLst>
-              <a:ext uri="{FF2B5EF4-FFF2-40B4-BE49-F238E27FC236}">
-                <a16:creationId xmlns:a16="http://schemas.microsoft.com/office/drawing/2014/main" id="{C4371E09-F551-40EB-AAA1-38AB2404BF9E}"/>
-              </a:ext>
-            </a:extLst>
-          </p:cNvPr>
-          <p:cNvSpPr txBox="1"/>
-          <p:nvPr/>
-        </p:nvSpPr>
-        <p:spPr>
-          <a:xfrm rot="16200000">
-            <a:off x="817706" y="1653870"/>
-            <a:ext cx="756169" cy="276999"/>
-          </a:xfrm>
-          <a:prstGeom prst="rect">
-            <a:avLst/>
-          </a:prstGeom>
-          <a:noFill/>
-        </p:spPr>
-        <p:txBody>
-          <a:bodyPr wrap="none" rtlCol="0">
-            <a:spAutoFit/>
-          </a:bodyPr>
-          <a:lstStyle/>
-          <a:p>
-            <a:r>
-              <a:rPr lang="en-US" sz="1200" dirty="0"/>
-              <a:t>Intensity</a:t>
-            </a:r>
-          </a:p>
-        </p:txBody>
-      </p:sp>
       <p:pic>
         <p:nvPicPr>
           <p:cNvPr id="10" name="Picture 9" descr="A graph with a blue curve&#10;&#10;Description automatically generated">
@@ -3093,7 +3023,7 @@
         </p:blipFill>
         <p:spPr>
           <a:xfrm>
-            <a:off x="420748" y="3944007"/>
+            <a:off x="420748" y="3702269"/>
             <a:ext cx="4151192" cy="2580288"/>
           </a:xfrm>
           <a:prstGeom prst="rect">
@@ -3115,7 +3045,7 @@
         </p:nvSpPr>
         <p:spPr>
           <a:xfrm>
-            <a:off x="2237527" y="333705"/>
+            <a:off x="2190351" y="653510"/>
             <a:ext cx="1029834" cy="338554"/>
           </a:xfrm>
           <a:prstGeom prst="rect">
@@ -3150,7 +3080,7 @@
         </p:nvSpPr>
         <p:spPr>
           <a:xfrm>
-            <a:off x="2190351" y="3774730"/>
+            <a:off x="2190351" y="3532992"/>
             <a:ext cx="1029834" cy="338554"/>
           </a:xfrm>
           <a:prstGeom prst="rect">

</xml_diff>